<commit_message>
Fixing small typos in presentation
</commit_message>
<xml_diff>
--- a/final_presentation.pptx
+++ b/final_presentation.pptx
@@ -112,6 +112,11 @@
       </a:defRPr>
     </a:lvl9pPr>
   </p:defaultTextStyle>
+  <p:extLst>
+    <p:ext uri="{EFAFB233-063F-42B5-8137-9DF3F51BA10A}">
+      <p15:sldGuideLst xmlns:p15="http://schemas.microsoft.com/office/powerpoint/2012/main"/>
+    </p:ext>
+  </p:extLst>
 </p:presentation>
 </file>
 
@@ -264,7 +269,7 @@
           <a:p>
             <a:fld id="{1390E2CF-B5EC-3A4B-890E-C08FA58E242E}" type="datetimeFigureOut">
               <a:rPr lang="af-ZA" smtClean="0"/>
-              <a:t>2024-02-10</a:t>
+              <a:t>2024-02-12</a:t>
             </a:fld>
             <a:endParaRPr lang="af-ZA"/>
           </a:p>
@@ -464,7 +469,7 @@
           <a:p>
             <a:fld id="{1390E2CF-B5EC-3A4B-890E-C08FA58E242E}" type="datetimeFigureOut">
               <a:rPr lang="af-ZA" smtClean="0"/>
-              <a:t>2024-02-10</a:t>
+              <a:t>2024-02-12</a:t>
             </a:fld>
             <a:endParaRPr lang="af-ZA"/>
           </a:p>
@@ -674,7 +679,7 @@
           <a:p>
             <a:fld id="{1390E2CF-B5EC-3A4B-890E-C08FA58E242E}" type="datetimeFigureOut">
               <a:rPr lang="af-ZA" smtClean="0"/>
-              <a:t>2024-02-10</a:t>
+              <a:t>2024-02-12</a:t>
             </a:fld>
             <a:endParaRPr lang="af-ZA"/>
           </a:p>
@@ -874,7 +879,7 @@
           <a:p>
             <a:fld id="{1390E2CF-B5EC-3A4B-890E-C08FA58E242E}" type="datetimeFigureOut">
               <a:rPr lang="af-ZA" smtClean="0"/>
-              <a:t>2024-02-10</a:t>
+              <a:t>2024-02-12</a:t>
             </a:fld>
             <a:endParaRPr lang="af-ZA"/>
           </a:p>
@@ -1150,7 +1155,7 @@
           <a:p>
             <a:fld id="{1390E2CF-B5EC-3A4B-890E-C08FA58E242E}" type="datetimeFigureOut">
               <a:rPr lang="af-ZA" smtClean="0"/>
-              <a:t>2024-02-10</a:t>
+              <a:t>2024-02-12</a:t>
             </a:fld>
             <a:endParaRPr lang="af-ZA"/>
           </a:p>
@@ -1418,7 +1423,7 @@
           <a:p>
             <a:fld id="{1390E2CF-B5EC-3A4B-890E-C08FA58E242E}" type="datetimeFigureOut">
               <a:rPr lang="af-ZA" smtClean="0"/>
-              <a:t>2024-02-10</a:t>
+              <a:t>2024-02-12</a:t>
             </a:fld>
             <a:endParaRPr lang="af-ZA"/>
           </a:p>
@@ -1833,7 +1838,7 @@
           <a:p>
             <a:fld id="{1390E2CF-B5EC-3A4B-890E-C08FA58E242E}" type="datetimeFigureOut">
               <a:rPr lang="af-ZA" smtClean="0"/>
-              <a:t>2024-02-10</a:t>
+              <a:t>2024-02-12</a:t>
             </a:fld>
             <a:endParaRPr lang="af-ZA"/>
           </a:p>
@@ -1975,7 +1980,7 @@
           <a:p>
             <a:fld id="{1390E2CF-B5EC-3A4B-890E-C08FA58E242E}" type="datetimeFigureOut">
               <a:rPr lang="af-ZA" smtClean="0"/>
-              <a:t>2024-02-10</a:t>
+              <a:t>2024-02-12</a:t>
             </a:fld>
             <a:endParaRPr lang="af-ZA"/>
           </a:p>
@@ -2088,7 +2093,7 @@
           <a:p>
             <a:fld id="{1390E2CF-B5EC-3A4B-890E-C08FA58E242E}" type="datetimeFigureOut">
               <a:rPr lang="af-ZA" smtClean="0"/>
-              <a:t>2024-02-10</a:t>
+              <a:t>2024-02-12</a:t>
             </a:fld>
             <a:endParaRPr lang="af-ZA"/>
           </a:p>
@@ -2401,7 +2406,7 @@
           <a:p>
             <a:fld id="{1390E2CF-B5EC-3A4B-890E-C08FA58E242E}" type="datetimeFigureOut">
               <a:rPr lang="af-ZA" smtClean="0"/>
-              <a:t>2024-02-10</a:t>
+              <a:t>2024-02-12</a:t>
             </a:fld>
             <a:endParaRPr lang="af-ZA"/>
           </a:p>
@@ -2690,7 +2695,7 @@
           <a:p>
             <a:fld id="{1390E2CF-B5EC-3A4B-890E-C08FA58E242E}" type="datetimeFigureOut">
               <a:rPr lang="af-ZA" smtClean="0"/>
-              <a:t>2024-02-10</a:t>
+              <a:t>2024-02-12</a:t>
             </a:fld>
             <a:endParaRPr lang="af-ZA"/>
           </a:p>
@@ -2933,7 +2938,7 @@
           <a:p>
             <a:fld id="{1390E2CF-B5EC-3A4B-890E-C08FA58E242E}" type="datetimeFigureOut">
               <a:rPr lang="af-ZA" smtClean="0"/>
-              <a:t>2024-02-10</a:t>
+              <a:t>2024-02-12</a:t>
             </a:fld>
             <a:endParaRPr lang="af-ZA"/>
           </a:p>
@@ -3443,12 +3448,6 @@
               </a:rPr>
               <a:t>Using a Random Forest classifier to identify fraudulent transactions</a:t>
             </a:r>
-            <a:endParaRPr lang="en-GB" b="1" i="1" dirty="0">
-              <a:solidFill>
-                <a:srgbClr val="FF87AA"/>
-              </a:solidFill>
-              <a:latin typeface="Helvetica Bold Oblique" pitchFamily="2" charset="0"/>
-            </a:endParaRPr>
           </a:p>
         </p:txBody>
       </p:sp>
@@ -7570,7 +7569,7 @@
                 <a:effectLst/>
                 <a:latin typeface="Helvetica" pitchFamily="2" charset="0"/>
               </a:rPr>
-              <a:t>Time-series data</a:t>
+              <a:t>Time-Series Data</a:t>
             </a:r>
           </a:p>
           <a:p>

</xml_diff>